<commit_message>
Update SEDS USA Organization Chart.pptx
</commit_message>
<xml_diff>
--- a/SEDSUSA/SEDS USA Organization Chart.pptx
+++ b/SEDSUSA/SEDS USA Organization Chart.pptx
@@ -14479,7 +14479,7 @@
         <p:spPr>
           <a:xfrm>
             <a:off x="7229024" y="259172"/>
-            <a:ext cx="2652231" cy="1569660"/>
+            <a:ext cx="2652231" cy="1384995"/>
           </a:xfrm>
           <a:prstGeom prst="rect">
             <a:avLst/>
@@ -14505,23 +14505,11 @@
               <a:t> </a:t>
             </a:r>
             <a:endParaRPr lang="en-US" sz="1200" dirty="0">
-              <a:latin typeface="Segoe UI" panose="020B0502040204020203" pitchFamily="34" charset="0"/>
+              <a:solidFill>
+                <a:srgbClr val="000000"/>
+              </a:solidFill>
+              <a:latin typeface="Calibri" panose="020F0502020204030204" pitchFamily="34" charset="0"/>
             </a:endParaRPr>
-          </a:p>
-          <a:p>
-            <a:pPr fontAlgn="base">
-              <a:buFont typeface="+mj-lt"/>
-              <a:buAutoNum type="arabicPeriod"/>
-            </a:pPr>
-            <a:r>
-              <a:rPr lang="en-US" sz="1200" dirty="0">
-                <a:solidFill>
-                  <a:srgbClr val="000000"/>
-                </a:solidFill>
-                <a:latin typeface="Calibri" panose="020F0502020204030204" pitchFamily="34" charset="0"/>
-              </a:rPr>
-              <a:t>Justine Walker </a:t>
-            </a:r>
           </a:p>
           <a:p>
             <a:pPr fontAlgn="base">
@@ -22777,6 +22765,15 @@
 </file>
 
 <file path=customXml/item1.xml><?xml version="1.0" encoding="utf-8"?>
+<?mso-contentType ?>
+<FormTemplates xmlns="http://schemas.microsoft.com/sharepoint/v3/contenttype/forms">
+  <Display>DocumentLibraryForm</Display>
+  <Edit>DocumentLibraryForm</Edit>
+  <New>DocumentLibraryForm</New>
+</FormTemplates>
+</file>
+
+<file path=customXml/item2.xml><?xml version="1.0" encoding="utf-8"?>
 <ct:contentTypeSchema xmlns:ct="http://schemas.microsoft.com/office/2006/metadata/contentType" xmlns:ma="http://schemas.microsoft.com/office/2006/metadata/properties/metaAttributes" ct:_="" ma:_="" ma:contentTypeName="Document" ma:contentTypeID="0x01010079F111ED35F8CC479449609E8A0923A6" ma:contentTypeVersion="11" ma:contentTypeDescription="Create a new document." ma:contentTypeScope="" ma:versionID="9677210f24a1be23c92c90fd886aa0aa">
   <xsd:schema xmlns:xsd="http://www.w3.org/2001/XMLSchema" xmlns:xs="http://www.w3.org/2001/XMLSchema" xmlns:p="http://schemas.microsoft.com/office/2006/metadata/properties" xmlns:ns2="71af3243-3dd4-4a8d-8c0d-dd76da1f02a5" xmlns:ns3="16c05727-aa75-4e4a-9b5f-8a80a1165891" targetNamespace="http://schemas.microsoft.com/office/2006/metadata/properties" ma:root="true" ma:fieldsID="60e05723c5c1908df1a1a4ebf11d344e" ns2:_="" ns3:_="">
     <xsd:import namespace="71af3243-3dd4-4a8d-8c0d-dd76da1f02a5"/>
@@ -22987,15 +22984,6 @@
 </ct:contentTypeSchema>
 </file>
 
-<file path=customXml/item2.xml><?xml version="1.0" encoding="utf-8"?>
-<?mso-contentType ?>
-<FormTemplates xmlns="http://schemas.microsoft.com/sharepoint/v3/contenttype/forms">
-  <Display>DocumentLibraryForm</Display>
-  <Edit>DocumentLibraryForm</Edit>
-  <New>DocumentLibraryForm</New>
-</FormTemplates>
-</file>
-
 <file path=customXml/item3.xml><?xml version="1.0" encoding="utf-8"?>
 <p:properties xmlns:p="http://schemas.microsoft.com/office/2006/metadata/properties" xmlns:xsi="http://www.w3.org/2001/XMLSchema-instance" xmlns:pc="http://schemas.microsoft.com/office/infopath/2007/PartnerControls">
   <documentManagement>
@@ -23005,6 +22993,14 @@
 </file>
 
 <file path=customXml/itemProps1.xml><?xml version="1.0" encoding="utf-8"?>
+<ds:datastoreItem xmlns:ds="http://schemas.openxmlformats.org/officeDocument/2006/customXml" ds:itemID="{9082A0F6-5C05-4A60-9DD8-B772877A4F89}">
+  <ds:schemaRefs>
+    <ds:schemaRef ds:uri="http://schemas.microsoft.com/sharepoint/v3/contenttype/forms"/>
+  </ds:schemaRefs>
+</ds:datastoreItem>
+</file>
+
+<file path=customXml/itemProps2.xml><?xml version="1.0" encoding="utf-8"?>
 <ds:datastoreItem xmlns:ds="http://schemas.openxmlformats.org/officeDocument/2006/customXml" ds:itemID="{840DE65C-3715-41A1-996C-103EA7902D46}">
   <ds:schemaRefs>
     <ds:schemaRef ds:uri="http://schemas.microsoft.com/office/2006/metadata/contentType"/>
@@ -23019,14 +23015,6 @@
     <ds:schemaRef ds:uri="http://purl.org/dc/elements/1.1/"/>
     <ds:schemaRef ds:uri="http://purl.org/dc/terms/"/>
     <ds:schemaRef ds:uri="http://schemas.microsoft.com/internal/obd"/>
-  </ds:schemaRefs>
-</ds:datastoreItem>
-</file>
-
-<file path=customXml/itemProps2.xml><?xml version="1.0" encoding="utf-8"?>
-<ds:datastoreItem xmlns:ds="http://schemas.openxmlformats.org/officeDocument/2006/customXml" ds:itemID="{9082A0F6-5C05-4A60-9DD8-B772877A4F89}">
-  <ds:schemaRefs>
-    <ds:schemaRef ds:uri="http://schemas.microsoft.com/sharepoint/v3/contenttype/forms"/>
   </ds:schemaRefs>
 </ds:datastoreItem>
 </file>

</xml_diff>